<commit_message>
worked more on teaser
</commit_message>
<xml_diff>
--- a/Paper/teaser.pptx
+++ b/Paper/teaser.pptx
@@ -8,7 +8,7 @@
     <p:sldId id="259" r:id="rId2"/>
     <p:sldId id="261" r:id="rId3"/>
   </p:sldIdLst>
-  <p:sldSz cx="6400800" cy="6400800"/>
+  <p:sldSz cx="6400800" cy="1096963"/>
   <p:notesSz cx="6858000" cy="9144000"/>
   <p:defaultTextStyle>
     <a:defPPr>
@@ -137,8 +137,8 @@
         </p:nvSpPr>
         <p:spPr>
           <a:xfrm>
-            <a:off x="480060" y="1988432"/>
-            <a:ext cx="5440680" cy="1372028"/>
+            <a:off x="480061" y="340776"/>
+            <a:ext cx="5440678" cy="235137"/>
           </a:xfrm>
         </p:spPr>
         <p:txBody>
@@ -165,8 +165,8 @@
         </p:nvSpPr>
         <p:spPr>
           <a:xfrm>
-            <a:off x="960120" y="3627131"/>
-            <a:ext cx="4480560" cy="1635767"/>
+            <a:off x="960124" y="621614"/>
+            <a:ext cx="4480562" cy="280337"/>
           </a:xfrm>
         </p:spPr>
         <p:txBody>
@@ -549,8 +549,8 @@
         </p:nvSpPr>
         <p:spPr>
           <a:xfrm>
-            <a:off x="4640580" y="256348"/>
-            <a:ext cx="1440180" cy="5461421"/>
+            <a:off x="4640577" y="43934"/>
+            <a:ext cx="1440182" cy="935973"/>
           </a:xfrm>
         </p:spPr>
         <p:txBody>
@@ -577,8 +577,8 @@
         </p:nvSpPr>
         <p:spPr>
           <a:xfrm>
-            <a:off x="320040" y="256348"/>
-            <a:ext cx="4213860" cy="5461421"/>
+            <a:off x="320043" y="43934"/>
+            <a:ext cx="4213858" cy="935973"/>
           </a:xfrm>
         </p:spPr>
         <p:txBody>
@@ -899,8 +899,8 @@
         </p:nvSpPr>
         <p:spPr>
           <a:xfrm>
-            <a:off x="505619" y="4113118"/>
-            <a:ext cx="5440680" cy="1271270"/>
+            <a:off x="505620" y="704902"/>
+            <a:ext cx="5440678" cy="217869"/>
           </a:xfrm>
         </p:spPr>
         <p:txBody>
@@ -931,8 +931,8 @@
         </p:nvSpPr>
         <p:spPr>
           <a:xfrm>
-            <a:off x="505619" y="2712960"/>
-            <a:ext cx="5440680" cy="1400177"/>
+            <a:off x="505620" y="464945"/>
+            <a:ext cx="5440678" cy="239961"/>
           </a:xfrm>
         </p:spPr>
         <p:txBody>
@@ -1168,8 +1168,8 @@
         </p:nvSpPr>
         <p:spPr>
           <a:xfrm>
-            <a:off x="320040" y="1493539"/>
-            <a:ext cx="2827020" cy="4224234"/>
+            <a:off x="320040" y="255961"/>
+            <a:ext cx="2827018" cy="723945"/>
           </a:xfrm>
         </p:spPr>
         <p:txBody>
@@ -1253,8 +1253,8 @@
         </p:nvSpPr>
         <p:spPr>
           <a:xfrm>
-            <a:off x="3253740" y="1493539"/>
-            <a:ext cx="2827020" cy="4224234"/>
+            <a:off x="3253742" y="255961"/>
+            <a:ext cx="2827018" cy="723945"/>
           </a:xfrm>
         </p:spPr>
         <p:txBody>
@@ -1460,8 +1460,8 @@
         </p:nvSpPr>
         <p:spPr>
           <a:xfrm>
-            <a:off x="320040" y="1432788"/>
-            <a:ext cx="2828132" cy="597109"/>
+            <a:off x="320043" y="245551"/>
+            <a:ext cx="2828132" cy="102332"/>
           </a:xfrm>
         </p:spPr>
         <p:txBody>
@@ -1525,8 +1525,8 @@
         </p:nvSpPr>
         <p:spPr>
           <a:xfrm>
-            <a:off x="320040" y="2029895"/>
-            <a:ext cx="2828132" cy="3687866"/>
+            <a:off x="320043" y="347882"/>
+            <a:ext cx="2828132" cy="632023"/>
           </a:xfrm>
         </p:spPr>
         <p:txBody>
@@ -1610,8 +1610,8 @@
         </p:nvSpPr>
         <p:spPr>
           <a:xfrm>
-            <a:off x="3251533" y="1432788"/>
-            <a:ext cx="2829243" cy="597109"/>
+            <a:off x="3251538" y="245551"/>
+            <a:ext cx="2829241" cy="102332"/>
           </a:xfrm>
         </p:spPr>
         <p:txBody>
@@ -1675,8 +1675,8 @@
         </p:nvSpPr>
         <p:spPr>
           <a:xfrm>
-            <a:off x="3251533" y="2029895"/>
-            <a:ext cx="2829243" cy="3687866"/>
+            <a:off x="3251538" y="347882"/>
+            <a:ext cx="2829241" cy="632023"/>
           </a:xfrm>
         </p:spPr>
         <p:txBody>
@@ -2068,8 +2068,8 @@
         </p:nvSpPr>
         <p:spPr>
           <a:xfrm>
-            <a:off x="320055" y="254852"/>
-            <a:ext cx="2105819" cy="1084578"/>
+            <a:off x="320061" y="43676"/>
+            <a:ext cx="2105817" cy="185874"/>
           </a:xfrm>
         </p:spPr>
         <p:txBody>
@@ -2100,8 +2100,8 @@
         </p:nvSpPr>
         <p:spPr>
           <a:xfrm>
-            <a:off x="2502550" y="254867"/>
-            <a:ext cx="3578225" cy="5462914"/>
+            <a:off x="2502555" y="43679"/>
+            <a:ext cx="3578224" cy="936229"/>
           </a:xfrm>
         </p:spPr>
         <p:txBody>
@@ -2185,8 +2185,8 @@
         </p:nvSpPr>
         <p:spPr>
           <a:xfrm>
-            <a:off x="320055" y="1339449"/>
-            <a:ext cx="2105819" cy="4378325"/>
+            <a:off x="320061" y="229555"/>
+            <a:ext cx="2105817" cy="750353"/>
           </a:xfrm>
         </p:spPr>
         <p:txBody>
@@ -2345,8 +2345,8 @@
         </p:nvSpPr>
         <p:spPr>
           <a:xfrm>
-            <a:off x="1254602" y="4480573"/>
-            <a:ext cx="3840480" cy="528955"/>
+            <a:off x="1254607" y="767877"/>
+            <a:ext cx="3840481" cy="90652"/>
           </a:xfrm>
         </p:spPr>
         <p:txBody>
@@ -2377,8 +2377,8 @@
         </p:nvSpPr>
         <p:spPr>
           <a:xfrm>
-            <a:off x="1254602" y="571932"/>
-            <a:ext cx="3840480" cy="3840482"/>
+            <a:off x="1254607" y="98017"/>
+            <a:ext cx="3840481" cy="658178"/>
           </a:xfrm>
         </p:spPr>
         <p:txBody>
@@ -2438,8 +2438,8 @@
         </p:nvSpPr>
         <p:spPr>
           <a:xfrm>
-            <a:off x="1254602" y="5009541"/>
-            <a:ext cx="3840480" cy="751207"/>
+            <a:off x="1254607" y="858532"/>
+            <a:ext cx="3840481" cy="128741"/>
           </a:xfrm>
         </p:spPr>
         <p:txBody>
@@ -2603,8 +2603,8 @@
         </p:nvSpPr>
         <p:spPr>
           <a:xfrm>
-            <a:off x="320040" y="256340"/>
-            <a:ext cx="5760720" cy="1066800"/>
+            <a:off x="320042" y="43932"/>
+            <a:ext cx="5760719" cy="182827"/>
           </a:xfrm>
           <a:prstGeom prst="rect">
             <a:avLst/>
@@ -2636,8 +2636,8 @@
         </p:nvSpPr>
         <p:spPr>
           <a:xfrm>
-            <a:off x="320040" y="1493539"/>
-            <a:ext cx="5760720" cy="4224234"/>
+            <a:off x="320042" y="255961"/>
+            <a:ext cx="5760719" cy="723945"/>
           </a:xfrm>
           <a:prstGeom prst="rect">
             <a:avLst/>
@@ -2698,8 +2698,8 @@
         </p:nvSpPr>
         <p:spPr>
           <a:xfrm>
-            <a:off x="320040" y="5932624"/>
-            <a:ext cx="1493520" cy="340783"/>
+            <a:off x="320042" y="1016728"/>
+            <a:ext cx="1493519" cy="58403"/>
           </a:xfrm>
           <a:prstGeom prst="rect">
             <a:avLst/>
@@ -2739,8 +2739,8 @@
         </p:nvSpPr>
         <p:spPr>
           <a:xfrm>
-            <a:off x="2186940" y="5932624"/>
-            <a:ext cx="2026920" cy="340783"/>
+            <a:off x="2186944" y="1016728"/>
+            <a:ext cx="2026922" cy="58403"/>
           </a:xfrm>
           <a:prstGeom prst="rect">
             <a:avLst/>
@@ -2776,8 +2776,8 @@
         </p:nvSpPr>
         <p:spPr>
           <a:xfrm>
-            <a:off x="4587240" y="5932624"/>
-            <a:ext cx="1493520" cy="340783"/>
+            <a:off x="4587242" y="1016728"/>
+            <a:ext cx="1493519" cy="58403"/>
           </a:xfrm>
           <a:prstGeom prst="rect">
             <a:avLst/>
@@ -3104,8 +3104,8 @@
         </p:nvGrpSpPr>
         <p:grpSpPr>
           <a:xfrm>
-            <a:off x="4764" y="21593"/>
-            <a:ext cx="6391275" cy="6297485"/>
+            <a:off x="4768" y="8463"/>
+            <a:ext cx="6391277" cy="1079257"/>
             <a:chOff x="9525" y="-2"/>
             <a:chExt cx="6413199" cy="1082959"/>
           </a:xfrm>
@@ -3502,34 +3502,48 @@
       </p:grpSpPr>
       <p:pic>
         <p:nvPicPr>
-          <p:cNvPr id="12" name="Picture 2" descr="D:\Papers\DrawAFriend\obama\IMG_1840.JPG"/>
+          <p:cNvPr id="20" name="Picture 2" descr="D:\Papers\DrawAFriend\obama\IMG_1840.JPG"/>
           <p:cNvPicPr>
             <a:picLocks noChangeAspect="1" noChangeArrowheads="1"/>
           </p:cNvPicPr>
           <p:nvPr/>
         </p:nvPicPr>
-        <p:blipFill>
+        <p:blipFill rotWithShape="1">
           <a:blip r:embed="rId2" cstate="print">
+            <a:duotone>
+              <a:schemeClr val="accent1">
+                <a:shade val="45000"/>
+                <a:satMod val="135000"/>
+              </a:schemeClr>
+              <a:prstClr val="white"/>
+            </a:duotone>
             <a:extLst>
               <a:ext uri="{28A0092B-C50C-407E-A947-70E740481C1C}">
                 <a14:useLocalDpi xmlns:a14="http://schemas.microsoft.com/office/drawing/2010/main" val="0"/>
               </a:ext>
             </a:extLst>
           </a:blip>
-          <a:srcRect/>
-          <a:stretch>
-            <a:fillRect/>
-          </a:stretch>
+          <a:srcRect t="4187" b="5876"/>
+          <a:stretch/>
         </p:blipFill>
         <p:spPr bwMode="auto">
           <a:xfrm>
-            <a:off x="381000" y="1143000"/>
-            <a:ext cx="1096934" cy="1645401"/>
+            <a:off x="753015" y="366"/>
+            <a:ext cx="748253" cy="1096596"/>
           </a:xfrm>
           <a:prstGeom prst="rect">
             <a:avLst/>
           </a:prstGeom>
-          <a:noFill/>
+          <a:solidFill>
+            <a:srgbClr val="FFFFFF">
+              <a:shade val="85000"/>
+            </a:srgbClr>
+          </a:solidFill>
+          <a:ln w="3175" cap="sq">
+            <a:noFill/>
+            <a:miter lim="800000"/>
+          </a:ln>
+          <a:effectLst/>
           <a:extLst>
             <a:ext uri="{909E8E84-426E-40DD-AFC4-6F175D3DCCD1}">
               <a14:hiddenFill xmlns:a14="http://schemas.microsoft.com/office/drawing/2010/main">
@@ -3543,34 +3557,48 @@
       </p:pic>
       <p:pic>
         <p:nvPicPr>
-          <p:cNvPr id="13" name="Picture 3" descr="D:\Papers\DrawAFriend\obama\IMG_1841.JPG"/>
+          <p:cNvPr id="21" name="Picture 3" descr="D:\Papers\DrawAFriend\obama\IMG_1841.JPG"/>
           <p:cNvPicPr>
             <a:picLocks noChangeAspect="1" noChangeArrowheads="1"/>
           </p:cNvPicPr>
           <p:nvPr/>
         </p:nvPicPr>
-        <p:blipFill>
+        <p:blipFill rotWithShape="1">
           <a:blip r:embed="rId3" cstate="print">
+            <a:duotone>
+              <a:schemeClr val="accent2">
+                <a:shade val="45000"/>
+                <a:satMod val="135000"/>
+              </a:schemeClr>
+              <a:prstClr val="white"/>
+            </a:duotone>
             <a:extLst>
               <a:ext uri="{28A0092B-C50C-407E-A947-70E740481C1C}">
                 <a14:useLocalDpi xmlns:a14="http://schemas.microsoft.com/office/drawing/2010/main" val="0"/>
               </a:ext>
             </a:extLst>
           </a:blip>
-          <a:srcRect/>
-          <a:stretch>
-            <a:fillRect/>
-          </a:stretch>
+          <a:srcRect t="4187" b="5876"/>
+          <a:stretch/>
         </p:blipFill>
         <p:spPr bwMode="auto">
           <a:xfrm>
-            <a:off x="382115" y="2667000"/>
-            <a:ext cx="1096934" cy="1645400"/>
+            <a:off x="4762" y="366"/>
+            <a:ext cx="748253" cy="1096596"/>
           </a:xfrm>
           <a:prstGeom prst="rect">
             <a:avLst/>
           </a:prstGeom>
-          <a:noFill/>
+          <a:solidFill>
+            <a:srgbClr val="FFFFFF">
+              <a:shade val="85000"/>
+            </a:srgbClr>
+          </a:solidFill>
+          <a:ln w="3175" cap="sq">
+            <a:noFill/>
+            <a:miter lim="800000"/>
+          </a:ln>
+          <a:effectLst/>
           <a:extLst>
             <a:ext uri="{909E8E84-426E-40DD-AFC4-6F175D3DCCD1}">
               <a14:hiddenFill xmlns:a14="http://schemas.microsoft.com/office/drawing/2010/main">
@@ -3584,34 +3612,48 @@
       </p:pic>
       <p:pic>
         <p:nvPicPr>
-          <p:cNvPr id="14" name="Picture 4" descr="D:\Papers\DrawAFriend\obama\IMG_2034.JPG"/>
+          <p:cNvPr id="24" name="Picture 6" descr="D:\Papers\DrawAFriend\obama\IMG_2314.JPG"/>
           <p:cNvPicPr>
             <a:picLocks noChangeAspect="1" noChangeArrowheads="1"/>
           </p:cNvPicPr>
           <p:nvPr/>
         </p:nvPicPr>
-        <p:blipFill>
+        <p:blipFill rotWithShape="1">
           <a:blip r:embed="rId4" cstate="print">
+            <a:duotone>
+              <a:schemeClr val="accent2">
+                <a:shade val="45000"/>
+                <a:satMod val="135000"/>
+              </a:schemeClr>
+              <a:prstClr val="white"/>
+            </a:duotone>
             <a:extLst>
               <a:ext uri="{28A0092B-C50C-407E-A947-70E740481C1C}">
                 <a14:useLocalDpi xmlns:a14="http://schemas.microsoft.com/office/drawing/2010/main" val="0"/>
               </a:ext>
             </a:extLst>
           </a:blip>
-          <a:srcRect/>
-          <a:stretch>
-            <a:fillRect/>
-          </a:stretch>
+          <a:srcRect t="4187" b="5876"/>
+          <a:stretch/>
         </p:blipFill>
         <p:spPr bwMode="auto">
           <a:xfrm>
-            <a:off x="1465840" y="2667000"/>
-            <a:ext cx="1096933" cy="1645400"/>
+            <a:off x="1632932" y="-765"/>
+            <a:ext cx="748253" cy="1096598"/>
           </a:xfrm>
           <a:prstGeom prst="rect">
             <a:avLst/>
           </a:prstGeom>
-          <a:noFill/>
+          <a:solidFill>
+            <a:srgbClr val="FFFFFF">
+              <a:shade val="85000"/>
+            </a:srgbClr>
+          </a:solidFill>
+          <a:ln w="3175" cap="sq">
+            <a:noFill/>
+            <a:miter lim="800000"/>
+          </a:ln>
+          <a:effectLst/>
           <a:extLst>
             <a:ext uri="{909E8E84-426E-40DD-AFC4-6F175D3DCCD1}">
               <a14:hiddenFill xmlns:a14="http://schemas.microsoft.com/office/drawing/2010/main">
@@ -3625,34 +3667,48 @@
       </p:pic>
       <p:pic>
         <p:nvPicPr>
-          <p:cNvPr id="15" name="Picture 5" descr="D:\Papers\DrawAFriend\obama\IMG_2033.JPG"/>
+          <p:cNvPr id="25" name="Picture 7" descr="D:\Papers\DrawAFriend\obama\IMG_2313.JPG"/>
           <p:cNvPicPr>
             <a:picLocks noChangeAspect="1" noChangeArrowheads="1"/>
           </p:cNvPicPr>
           <p:nvPr/>
         </p:nvPicPr>
-        <p:blipFill>
+        <p:blipFill rotWithShape="1">
           <a:blip r:embed="rId5" cstate="print">
+            <a:duotone>
+              <a:schemeClr val="accent1">
+                <a:shade val="45000"/>
+                <a:satMod val="135000"/>
+              </a:schemeClr>
+              <a:prstClr val="white"/>
+            </a:duotone>
             <a:extLst>
               <a:ext uri="{28A0092B-C50C-407E-A947-70E740481C1C}">
                 <a14:useLocalDpi xmlns:a14="http://schemas.microsoft.com/office/drawing/2010/main" val="0"/>
               </a:ext>
             </a:extLst>
           </a:blip>
-          <a:srcRect/>
-          <a:stretch>
-            <a:fillRect/>
-          </a:stretch>
+          <a:srcRect t="4187" b="5876"/>
+          <a:stretch/>
         </p:blipFill>
         <p:spPr bwMode="auto">
           <a:xfrm>
-            <a:off x="1465004" y="1143000"/>
-            <a:ext cx="1096933" cy="1645400"/>
+            <a:off x="2381186" y="-765"/>
+            <a:ext cx="748253" cy="1096598"/>
           </a:xfrm>
           <a:prstGeom prst="rect">
             <a:avLst/>
           </a:prstGeom>
-          <a:noFill/>
+          <a:solidFill>
+            <a:srgbClr val="FFFFFF">
+              <a:shade val="85000"/>
+            </a:srgbClr>
+          </a:solidFill>
+          <a:ln w="3175" cap="sq">
+            <a:noFill/>
+            <a:miter lim="800000"/>
+          </a:ln>
+          <a:effectLst/>
           <a:extLst>
             <a:ext uri="{909E8E84-426E-40DD-AFC4-6F175D3DCCD1}">
               <a14:hiddenFill xmlns:a14="http://schemas.microsoft.com/office/drawing/2010/main">
@@ -3666,34 +3722,42 @@
       </p:pic>
       <p:pic>
         <p:nvPicPr>
-          <p:cNvPr id="16" name="Picture 6" descr="D:\Papers\DrawAFriend\obama\IMG_2314.JPG"/>
+          <p:cNvPr id="3" name="Picture 2" descr="C:\Users\Nicolas\Desktop\best\obama_best\IMG_2249.JPG"/>
           <p:cNvPicPr>
             <a:picLocks noChangeAspect="1" noChangeArrowheads="1"/>
           </p:cNvPicPr>
           <p:nvPr/>
         </p:nvPicPr>
-        <p:blipFill>
+        <p:blipFill rotWithShape="1">
           <a:blip r:embed="rId6" cstate="print">
+            <a:duotone>
+              <a:schemeClr val="accent1">
+                <a:shade val="45000"/>
+                <a:satMod val="135000"/>
+              </a:schemeClr>
+              <a:prstClr val="white"/>
+            </a:duotone>
             <a:extLst>
               <a:ext uri="{28A0092B-C50C-407E-A947-70E740481C1C}">
                 <a14:useLocalDpi xmlns:a14="http://schemas.microsoft.com/office/drawing/2010/main" val="0"/>
               </a:ext>
             </a:extLst>
           </a:blip>
-          <a:srcRect/>
-          <a:stretch>
-            <a:fillRect/>
-          </a:stretch>
+          <a:srcRect t="4167" b="5848"/>
+          <a:stretch/>
         </p:blipFill>
         <p:spPr bwMode="auto">
           <a:xfrm>
-            <a:off x="2549564" y="2667000"/>
-            <a:ext cx="1096934" cy="1645400"/>
+            <a:off x="4018964" y="-765"/>
+            <a:ext cx="747080" cy="1095467"/>
           </a:xfrm>
           <a:prstGeom prst="rect">
             <a:avLst/>
           </a:prstGeom>
           <a:noFill/>
+          <a:ln w="3175">
+            <a:noFill/>
+          </a:ln>
           <a:extLst>
             <a:ext uri="{909E8E84-426E-40DD-AFC4-6F175D3DCCD1}">
               <a14:hiddenFill xmlns:a14="http://schemas.microsoft.com/office/drawing/2010/main">
@@ -3707,34 +3771,42 @@
       </p:pic>
       <p:pic>
         <p:nvPicPr>
-          <p:cNvPr id="17" name="Picture 7" descr="D:\Papers\DrawAFriend\obama\IMG_2313.JPG"/>
+          <p:cNvPr id="4" name="Picture 3" descr="C:\Users\Nicolas\Desktop\best\obama_best\IMG_2250.JPG"/>
           <p:cNvPicPr>
             <a:picLocks noChangeAspect="1" noChangeArrowheads="1"/>
           </p:cNvPicPr>
           <p:nvPr/>
         </p:nvPicPr>
-        <p:blipFill>
+        <p:blipFill rotWithShape="1">
           <a:blip r:embed="rId7" cstate="print">
+            <a:duotone>
+              <a:schemeClr val="accent2">
+                <a:shade val="45000"/>
+                <a:satMod val="135000"/>
+              </a:schemeClr>
+              <a:prstClr val="white"/>
+            </a:duotone>
             <a:extLst>
               <a:ext uri="{28A0092B-C50C-407E-A947-70E740481C1C}">
                 <a14:useLocalDpi xmlns:a14="http://schemas.microsoft.com/office/drawing/2010/main" val="0"/>
               </a:ext>
             </a:extLst>
           </a:blip>
-          <a:srcRect/>
-          <a:stretch>
-            <a:fillRect/>
-          </a:stretch>
+          <a:srcRect t="4167" b="5848"/>
+          <a:stretch/>
         </p:blipFill>
         <p:spPr bwMode="auto">
           <a:xfrm>
-            <a:off x="2549007" y="1143000"/>
-            <a:ext cx="1096934" cy="1645400"/>
+            <a:off x="3267097" y="366"/>
+            <a:ext cx="747080" cy="1095467"/>
           </a:xfrm>
           <a:prstGeom prst="rect">
             <a:avLst/>
           </a:prstGeom>
           <a:noFill/>
+          <a:ln w="3175">
+            <a:noFill/>
+          </a:ln>
           <a:extLst>
             <a:ext uri="{909E8E84-426E-40DD-AFC4-6F175D3DCCD1}">
               <a14:hiddenFill xmlns:a14="http://schemas.microsoft.com/office/drawing/2010/main">
@@ -3748,34 +3820,42 @@
       </p:pic>
       <p:pic>
         <p:nvPicPr>
-          <p:cNvPr id="18" name="Picture 8" descr="D:\Papers\DrawAFriend\obama\IMG_2142.JPG"/>
+          <p:cNvPr id="2052" name="Picture 4" descr="C:\Users\Nicolas\Desktop\best\obama_best\IMG_2338.JPG"/>
           <p:cNvPicPr>
             <a:picLocks noChangeAspect="1" noChangeArrowheads="1"/>
           </p:cNvPicPr>
           <p:nvPr/>
         </p:nvPicPr>
-        <p:blipFill>
+        <p:blipFill rotWithShape="1">
           <a:blip r:embed="rId8" cstate="print">
+            <a:duotone>
+              <a:schemeClr val="accent2">
+                <a:shade val="45000"/>
+                <a:satMod val="135000"/>
+              </a:schemeClr>
+              <a:prstClr val="white"/>
+            </a:duotone>
             <a:extLst>
               <a:ext uri="{28A0092B-C50C-407E-A947-70E740481C1C}">
                 <a14:useLocalDpi xmlns:a14="http://schemas.microsoft.com/office/drawing/2010/main" val="0"/>
               </a:ext>
             </a:extLst>
           </a:blip>
-          <a:srcRect/>
-          <a:stretch>
-            <a:fillRect/>
-          </a:stretch>
+          <a:srcRect t="4085" b="6412"/>
+          <a:stretch/>
         </p:blipFill>
         <p:spPr bwMode="auto">
           <a:xfrm>
-            <a:off x="3633289" y="2667000"/>
-            <a:ext cx="1104319" cy="1656479"/>
+            <a:off x="4897067" y="366"/>
+            <a:ext cx="751867" cy="1096597"/>
           </a:xfrm>
           <a:prstGeom prst="rect">
             <a:avLst/>
           </a:prstGeom>
           <a:noFill/>
+          <a:ln w="3175">
+            <a:noFill/>
+          </a:ln>
           <a:extLst>
             <a:ext uri="{909E8E84-426E-40DD-AFC4-6F175D3DCCD1}">
               <a14:hiddenFill xmlns:a14="http://schemas.microsoft.com/office/drawing/2010/main">
@@ -3789,116 +3869,42 @@
       </p:pic>
       <p:pic>
         <p:nvPicPr>
-          <p:cNvPr id="19" name="Picture 9" descr="D:\Papers\DrawAFriend\obama\IMG_2141.JPG"/>
+          <p:cNvPr id="2053" name="Picture 5" descr="C:\Users\Nicolas\Desktop\best\obama_best\IMG_2337.JPG"/>
           <p:cNvPicPr>
             <a:picLocks noChangeAspect="1" noChangeArrowheads="1"/>
           </p:cNvPicPr>
           <p:nvPr/>
         </p:nvPicPr>
-        <p:blipFill>
+        <p:blipFill rotWithShape="1">
           <a:blip r:embed="rId9" cstate="print">
+            <a:duotone>
+              <a:schemeClr val="accent1">
+                <a:shade val="45000"/>
+                <a:satMod val="135000"/>
+              </a:schemeClr>
+              <a:prstClr val="white"/>
+            </a:duotone>
             <a:extLst>
               <a:ext uri="{28A0092B-C50C-407E-A947-70E740481C1C}">
                 <a14:useLocalDpi xmlns:a14="http://schemas.microsoft.com/office/drawing/2010/main" val="0"/>
               </a:ext>
             </a:extLst>
           </a:blip>
-          <a:srcRect/>
-          <a:stretch>
-            <a:fillRect/>
-          </a:stretch>
+          <a:srcRect t="4167" b="6329"/>
+          <a:stretch/>
         </p:blipFill>
         <p:spPr bwMode="auto">
           <a:xfrm>
-            <a:off x="3633011" y="1143000"/>
-            <a:ext cx="1104319" cy="1656479"/>
+            <a:off x="5648934" y="800"/>
+            <a:ext cx="751867" cy="1096597"/>
           </a:xfrm>
           <a:prstGeom prst="rect">
             <a:avLst/>
           </a:prstGeom>
           <a:noFill/>
-          <a:extLst>
-            <a:ext uri="{909E8E84-426E-40DD-AFC4-6F175D3DCCD1}">
-              <a14:hiddenFill xmlns:a14="http://schemas.microsoft.com/office/drawing/2010/main">
-                <a:solidFill>
-                  <a:srgbClr val="FFFFFF"/>
-                </a:solidFill>
-              </a14:hiddenFill>
-            </a:ext>
-          </a:extLst>
-        </p:spPr>
-      </p:pic>
-      <p:pic>
-        <p:nvPicPr>
-          <p:cNvPr id="2050" name="Picture 2" descr="D:\Papers\DrawAFriend\obama\IMG_2138.JPG"/>
-          <p:cNvPicPr>
-            <a:picLocks noChangeAspect="1" noChangeArrowheads="1"/>
-          </p:cNvPicPr>
-          <p:nvPr/>
-        </p:nvPicPr>
-        <p:blipFill>
-          <a:blip r:embed="rId10" cstate="print">
-            <a:extLst>
-              <a:ext uri="{28A0092B-C50C-407E-A947-70E740481C1C}">
-                <a14:useLocalDpi xmlns:a14="http://schemas.microsoft.com/office/drawing/2010/main" val="0"/>
-              </a:ext>
-            </a:extLst>
-          </a:blip>
-          <a:srcRect/>
-          <a:stretch>
-            <a:fillRect/>
-          </a:stretch>
-        </p:blipFill>
-        <p:spPr bwMode="auto">
-          <a:xfrm>
-            <a:off x="4724400" y="2662193"/>
-            <a:ext cx="1100138" cy="1650207"/>
-          </a:xfrm>
-          <a:prstGeom prst="rect">
-            <a:avLst/>
-          </a:prstGeom>
-          <a:noFill/>
-          <a:extLst>
-            <a:ext uri="{909E8E84-426E-40DD-AFC4-6F175D3DCCD1}">
-              <a14:hiddenFill xmlns:a14="http://schemas.microsoft.com/office/drawing/2010/main">
-                <a:solidFill>
-                  <a:srgbClr val="FFFFFF"/>
-                </a:solidFill>
-              </a14:hiddenFill>
-            </a:ext>
-          </a:extLst>
-        </p:spPr>
-      </p:pic>
-      <p:pic>
-        <p:nvPicPr>
-          <p:cNvPr id="2051" name="Picture 3" descr="D:\Papers\DrawAFriend\obama\IMG_2137.JPG"/>
-          <p:cNvPicPr>
-            <a:picLocks noChangeAspect="1" noChangeArrowheads="1"/>
-          </p:cNvPicPr>
-          <p:nvPr/>
-        </p:nvPicPr>
-        <p:blipFill>
-          <a:blip r:embed="rId11" cstate="print">
-            <a:extLst>
-              <a:ext uri="{28A0092B-C50C-407E-A947-70E740481C1C}">
-                <a14:useLocalDpi xmlns:a14="http://schemas.microsoft.com/office/drawing/2010/main" val="0"/>
-              </a:ext>
-            </a:extLst>
-          </a:blip>
-          <a:srcRect/>
-          <a:stretch>
-            <a:fillRect/>
-          </a:stretch>
-        </p:blipFill>
-        <p:spPr bwMode="auto">
-          <a:xfrm>
-            <a:off x="4714875" y="1152481"/>
-            <a:ext cx="1100138" cy="1650207"/>
-          </a:xfrm>
-          <a:prstGeom prst="rect">
-            <a:avLst/>
-          </a:prstGeom>
-          <a:noFill/>
+          <a:ln w="3175">
+            <a:noFill/>
+          </a:ln>
           <a:extLst>
             <a:ext uri="{909E8E84-426E-40DD-AFC4-6F175D3DCCD1}">
               <a14:hiddenFill xmlns:a14="http://schemas.microsoft.com/office/drawing/2010/main">
@@ -3920,6 +3926,13 @@
   <p:clrMapOvr>
     <a:masterClrMapping/>
   </p:clrMapOvr>
+  <p:timing>
+    <p:tnLst>
+      <p:par>
+        <p:cTn id="1" dur="indefinite" restart="never" nodeType="tmRoot"/>
+      </p:par>
+    </p:tnLst>
+  </p:timing>
 </p:sld>
 </file>
 

</xml_diff>